<commit_message>
some minor formatting tweaks to the pptx.
</commit_message>
<xml_diff>
--- a/rubynation.pptx
+++ b/rubynation.pptx
@@ -3578,6 +3578,13 @@
   <p:clrMapOvr>
     <a:masterClrMapping/>
   </p:clrMapOvr>
+  <p:timing>
+    <p:tnLst>
+      <p:par>
+        <p:cTn id="1" dur="indefinite" restart="never" nodeType="tmRoot"/>
+      </p:par>
+    </p:tnLst>
+  </p:timing>
 </p:sld>
 </file>
 
@@ -3710,6 +3717,13 @@
   <p:clrMapOvr>
     <a:masterClrMapping/>
   </p:clrMapOvr>
+  <p:timing>
+    <p:tnLst>
+      <p:par>
+        <p:cTn id="1" dur="indefinite" restart="never" nodeType="tmRoot"/>
+      </p:par>
+    </p:tnLst>
+  </p:timing>
 </p:sld>
 </file>
 
@@ -3824,6 +3838,13 @@
   <p:clrMapOvr>
     <a:masterClrMapping/>
   </p:clrMapOvr>
+  <p:timing>
+    <p:tnLst>
+      <p:par>
+        <p:cTn id="1" dur="indefinite" restart="never" nodeType="tmRoot"/>
+      </p:par>
+    </p:tnLst>
+  </p:timing>
 </p:sld>
 </file>
 
@@ -3966,6 +3987,13 @@
   <p:clrMapOvr>
     <a:masterClrMapping/>
   </p:clrMapOvr>
+  <p:timing>
+    <p:tnLst>
+      <p:par>
+        <p:cTn id="1" dur="indefinite" restart="never" nodeType="tmRoot"/>
+      </p:par>
+    </p:tnLst>
+  </p:timing>
 </p:sld>
 </file>
 
@@ -4080,6 +4108,13 @@
   <p:clrMapOvr>
     <a:masterClrMapping/>
   </p:clrMapOvr>
+  <p:timing>
+    <p:tnLst>
+      <p:par>
+        <p:cTn id="1" dur="indefinite" restart="never" nodeType="tmRoot"/>
+      </p:par>
+    </p:tnLst>
+  </p:timing>
 </p:sld>
 </file>
 
@@ -4232,6 +4267,13 @@
   <p:clrMapOvr>
     <a:masterClrMapping/>
   </p:clrMapOvr>
+  <p:timing>
+    <p:tnLst>
+      <p:par>
+        <p:cTn id="1" dur="indefinite" restart="never" nodeType="tmRoot"/>
+      </p:par>
+    </p:tnLst>
+  </p:timing>
 </p:sld>
 </file>
 
@@ -4346,6 +4388,13 @@
   <p:clrMapOvr>
     <a:masterClrMapping/>
   </p:clrMapOvr>
+  <p:timing>
+    <p:tnLst>
+      <p:par>
+        <p:cTn id="1" dur="indefinite" restart="never" nodeType="tmRoot"/>
+      </p:par>
+    </p:tnLst>
+  </p:timing>
 </p:sld>
 </file>
 
@@ -4460,6 +4509,13 @@
   <p:clrMapOvr>
     <a:masterClrMapping/>
   </p:clrMapOvr>
+  <p:timing>
+    <p:tnLst>
+      <p:par>
+        <p:cTn id="1" dur="indefinite" restart="never" nodeType="tmRoot"/>
+      </p:par>
+    </p:tnLst>
+  </p:timing>
 </p:sld>
 </file>
 
@@ -4622,6 +4678,13 @@
   <p:clrMapOvr>
     <a:masterClrMapping/>
   </p:clrMapOvr>
+  <p:timing>
+    <p:tnLst>
+      <p:par>
+        <p:cTn id="1" dur="indefinite" restart="never" nodeType="tmRoot"/>
+      </p:par>
+    </p:tnLst>
+  </p:timing>
 </p:sld>
 </file>
 
@@ -4771,6 +4834,13 @@
   <p:clrMapOvr>
     <a:masterClrMapping/>
   </p:clrMapOvr>
+  <p:timing>
+    <p:tnLst>
+      <p:par>
+        <p:cTn id="1" dur="indefinite" restart="never" nodeType="tmRoot"/>
+      </p:par>
+    </p:tnLst>
+  </p:timing>
 </p:sld>
 </file>
 
@@ -4944,6 +5014,13 @@
   <p:clrMapOvr>
     <a:masterClrMapping/>
   </p:clrMapOvr>
+  <p:timing>
+    <p:tnLst>
+      <p:par>
+        <p:cTn id="1" dur="indefinite" restart="never" nodeType="tmRoot"/>
+      </p:par>
+    </p:tnLst>
+  </p:timing>
 </p:sld>
 </file>
 
@@ -5219,6 +5296,13 @@
   <p:clrMapOvr>
     <a:masterClrMapping/>
   </p:clrMapOvr>
+  <p:timing>
+    <p:tnLst>
+      <p:par>
+        <p:cTn id="1" dur="indefinite" restart="never" nodeType="tmRoot"/>
+      </p:par>
+    </p:tnLst>
+  </p:timing>
 </p:sld>
 </file>
 
@@ -5333,6 +5417,13 @@
   <p:clrMapOvr>
     <a:masterClrMapping/>
   </p:clrMapOvr>
+  <p:timing>
+    <p:tnLst>
+      <p:par>
+        <p:cTn id="1" dur="indefinite" restart="never" nodeType="tmRoot"/>
+      </p:par>
+    </p:tnLst>
+  </p:timing>
 </p:sld>
 </file>
 
@@ -5506,6 +5597,13 @@
   <p:clrMapOvr>
     <a:masterClrMapping/>
   </p:clrMapOvr>
+  <p:timing>
+    <p:tnLst>
+      <p:par>
+        <p:cTn id="1" dur="indefinite" restart="never" nodeType="tmRoot"/>
+      </p:par>
+    </p:tnLst>
+  </p:timing>
 </p:sld>
 </file>
 
@@ -5644,6 +5742,13 @@
   <p:clrMapOvr>
     <a:masterClrMapping/>
   </p:clrMapOvr>
+  <p:timing>
+    <p:tnLst>
+      <p:par>
+        <p:cTn id="1" dur="indefinite" restart="never" nodeType="tmRoot"/>
+      </p:par>
+    </p:tnLst>
+  </p:timing>
 </p:sld>
 </file>
 
@@ -5776,6 +5881,13 @@
   <p:clrMapOvr>
     <a:masterClrMapping/>
   </p:clrMapOvr>
+  <p:timing>
+    <p:tnLst>
+      <p:par>
+        <p:cTn id="1" dur="indefinite" restart="never" nodeType="tmRoot"/>
+      </p:par>
+    </p:tnLst>
+  </p:timing>
 </p:sld>
 </file>
 
@@ -5890,6 +6002,13 @@
   <p:clrMapOvr>
     <a:masterClrMapping/>
   </p:clrMapOvr>
+  <p:timing>
+    <p:tnLst>
+      <p:par>
+        <p:cTn id="1" dur="indefinite" restart="never" nodeType="tmRoot"/>
+      </p:par>
+    </p:tnLst>
+  </p:timing>
 </p:sld>
 </file>
 
@@ -6033,6 +6152,13 @@
   <p:clrMapOvr>
     <a:masterClrMapping/>
   </p:clrMapOvr>
+  <p:timing>
+    <p:tnLst>
+      <p:par>
+        <p:cTn id="1" dur="indefinite" restart="never" nodeType="tmRoot"/>
+      </p:par>
+    </p:tnLst>
+  </p:timing>
 </p:sld>
 </file>
 
@@ -6181,6 +6307,13 @@
   <p:clrMapOvr>
     <a:masterClrMapping/>
   </p:clrMapOvr>
+  <p:timing>
+    <p:tnLst>
+      <p:par>
+        <p:cTn id="1" dur="indefinite" restart="never" nodeType="tmRoot"/>
+      </p:par>
+    </p:tnLst>
+  </p:timing>
 </p:sld>
 </file>
 
@@ -6335,6 +6468,13 @@
   <p:clrMapOvr>
     <a:masterClrMapping/>
   </p:clrMapOvr>
+  <p:timing>
+    <p:tnLst>
+      <p:par>
+        <p:cTn id="1" dur="indefinite" restart="never" nodeType="tmRoot"/>
+      </p:par>
+    </p:tnLst>
+  </p:timing>
 </p:sld>
 </file>
 
@@ -6477,6 +6617,13 @@
   <p:clrMapOvr>
     <a:masterClrMapping/>
   </p:clrMapOvr>
+  <p:timing>
+    <p:tnLst>
+      <p:par>
+        <p:cTn id="1" dur="indefinite" restart="never" nodeType="tmRoot"/>
+      </p:par>
+    </p:tnLst>
+  </p:timing>
 </p:sld>
 </file>
 
@@ -6716,7 +6863,12 @@
             <a:fillRect/>
           </a:stretch>
         </p:blipFill>
-        <p:spPr/>
+        <p:spPr>
+          <a:xfrm>
+            <a:off x="302591" y="0"/>
+            <a:ext cx="8229600" cy="4525963"/>
+          </a:xfrm>
+        </p:spPr>
       </p:pic>
       <p:sp>
         <p:nvSpPr>
@@ -6770,6 +6922,13 @@
   <p:clrMapOvr>
     <a:masterClrMapping/>
   </p:clrMapOvr>
+  <p:timing>
+    <p:tnLst>
+      <p:par>
+        <p:cTn id="1" dur="indefinite" restart="never" nodeType="tmRoot"/>
+      </p:par>
+    </p:tnLst>
+  </p:timing>
 </p:sld>
 </file>
 
@@ -6832,7 +6991,7 @@
         </p:blipFill>
         <p:spPr>
           <a:xfrm>
-            <a:off x="457200" y="1611243"/>
+            <a:off x="457200" y="252895"/>
             <a:ext cx="8229600" cy="4525963"/>
           </a:xfrm>
         </p:spPr>
@@ -6889,6 +7048,13 @@
   <p:clrMapOvr>
     <a:masterClrMapping/>
   </p:clrMapOvr>
+  <p:timing>
+    <p:tnLst>
+      <p:par>
+        <p:cTn id="1" dur="indefinite" restart="never" nodeType="tmRoot"/>
+      </p:par>
+    </p:tnLst>
+  </p:timing>
 </p:sld>
 </file>
 
@@ -6949,7 +7115,12 @@
             <a:fillRect/>
           </a:stretch>
         </p:blipFill>
-        <p:spPr/>
+        <p:spPr>
+          <a:xfrm>
+            <a:off x="457200" y="562113"/>
+            <a:ext cx="8229600" cy="4525963"/>
+          </a:xfrm>
+        </p:spPr>
       </p:pic>
       <p:sp>
         <p:nvSpPr>
@@ -7003,6 +7174,13 @@
   <p:clrMapOvr>
     <a:masterClrMapping/>
   </p:clrMapOvr>
+  <p:timing>
+    <p:tnLst>
+      <p:par>
+        <p:cTn id="1" dur="indefinite" restart="never" nodeType="tmRoot"/>
+      </p:par>
+    </p:tnLst>
+  </p:timing>
 </p:sld>
 </file>
 
@@ -7063,7 +7241,12 @@
             <a:fillRect/>
           </a:stretch>
         </p:blipFill>
-        <p:spPr/>
+        <p:spPr>
+          <a:xfrm>
+            <a:off x="457200" y="68682"/>
+            <a:ext cx="8229600" cy="4525963"/>
+          </a:xfrm>
+        </p:spPr>
       </p:pic>
       <p:sp>
         <p:nvSpPr>
@@ -7117,6 +7300,13 @@
   <p:clrMapOvr>
     <a:masterClrMapping/>
   </p:clrMapOvr>
+  <p:timing>
+    <p:tnLst>
+      <p:par>
+        <p:cTn id="1" dur="indefinite" restart="never" nodeType="tmRoot"/>
+      </p:par>
+    </p:tnLst>
+  </p:timing>
 </p:sld>
 </file>
 
@@ -7280,6 +7470,13 @@
   <p:clrMapOvr>
     <a:masterClrMapping/>
   </p:clrMapOvr>
+  <p:timing>
+    <p:tnLst>
+      <p:par>
+        <p:cTn id="1" dur="indefinite" restart="never" nodeType="tmRoot"/>
+      </p:par>
+    </p:tnLst>
+  </p:timing>
 </p:sld>
 </file>
 
@@ -7418,6 +7615,13 @@
   <p:clrMapOvr>
     <a:masterClrMapping/>
   </p:clrMapOvr>
+  <p:timing>
+    <p:tnLst>
+      <p:par>
+        <p:cTn id="1" dur="indefinite" restart="never" nodeType="tmRoot"/>
+      </p:par>
+    </p:tnLst>
+  </p:timing>
 </p:sld>
 </file>
 
@@ -7560,6 +7764,13 @@
   <p:clrMapOvr>
     <a:masterClrMapping/>
   </p:clrMapOvr>
+  <p:timing>
+    <p:tnLst>
+      <p:par>
+        <p:cTn id="1" dur="indefinite" restart="never" nodeType="tmRoot"/>
+      </p:par>
+    </p:tnLst>
+  </p:timing>
 </p:sld>
 </file>
 
@@ -7714,6 +7925,13 @@
   <p:clrMapOvr>
     <a:masterClrMapping/>
   </p:clrMapOvr>
+  <p:timing>
+    <p:tnLst>
+      <p:par>
+        <p:cTn id="1" dur="indefinite" restart="never" nodeType="tmRoot"/>
+      </p:par>
+    </p:tnLst>
+  </p:timing>
 </p:sld>
 </file>
 
@@ -7852,6 +8070,13 @@
   <p:clrMapOvr>
     <a:masterClrMapping/>
   </p:clrMapOvr>
+  <p:timing>
+    <p:tnLst>
+      <p:par>
+        <p:cTn id="1" dur="indefinite" restart="never" nodeType="tmRoot"/>
+      </p:par>
+    </p:tnLst>
+  </p:timing>
 </p:sld>
 </file>
 
@@ -8020,6 +8245,13 @@
   <p:clrMapOvr>
     <a:masterClrMapping/>
   </p:clrMapOvr>
+  <p:timing>
+    <p:tnLst>
+      <p:par>
+        <p:cTn id="1" dur="indefinite" restart="never" nodeType="tmRoot"/>
+      </p:par>
+    </p:tnLst>
+  </p:timing>
 </p:sld>
 </file>
 
@@ -8307,6 +8539,13 @@
   <p:clrMapOvr>
     <a:masterClrMapping/>
   </p:clrMapOvr>
+  <p:timing>
+    <p:tnLst>
+      <p:par>
+        <p:cTn id="1" dur="indefinite" restart="never" nodeType="tmRoot"/>
+      </p:par>
+    </p:tnLst>
+  </p:timing>
 </p:sld>
 </file>
 
@@ -8439,6 +8678,13 @@
   <p:clrMapOvr>
     <a:masterClrMapping/>
   </p:clrMapOvr>
+  <p:timing>
+    <p:tnLst>
+      <p:par>
+        <p:cTn id="1" dur="indefinite" restart="never" nodeType="tmRoot"/>
+      </p:par>
+    </p:tnLst>
+  </p:timing>
 </p:sld>
 </file>
 
@@ -8581,6 +8827,13 @@
   <p:clrMapOvr>
     <a:masterClrMapping/>
   </p:clrMapOvr>
+  <p:timing>
+    <p:tnLst>
+      <p:par>
+        <p:cTn id="1" dur="indefinite" restart="never" nodeType="tmRoot"/>
+      </p:par>
+    </p:tnLst>
+  </p:timing>
 </p:sld>
 </file>
 
@@ -8732,6 +8985,13 @@
   <p:clrMapOvr>
     <a:masterClrMapping/>
   </p:clrMapOvr>
+  <p:timing>
+    <p:tnLst>
+      <p:par>
+        <p:cTn id="1" dur="indefinite" restart="never" nodeType="tmRoot"/>
+      </p:par>
+    </p:tnLst>
+  </p:timing>
 </p:sld>
 </file>
 
@@ -8894,6 +9154,13 @@
   <p:clrMapOvr>
     <a:masterClrMapping/>
   </p:clrMapOvr>
+  <p:timing>
+    <p:tnLst>
+      <p:par>
+        <p:cTn id="1" dur="indefinite" restart="never" nodeType="tmRoot"/>
+      </p:par>
+    </p:tnLst>
+  </p:timing>
 </p:sld>
 </file>
 
@@ -9051,6 +9318,13 @@
   <p:clrMapOvr>
     <a:masterClrMapping/>
   </p:clrMapOvr>
+  <p:timing>
+    <p:tnLst>
+      <p:par>
+        <p:cTn id="1" dur="indefinite" restart="never" nodeType="tmRoot"/>
+      </p:par>
+    </p:tnLst>
+  </p:timing>
 </p:sld>
 </file>
 
@@ -9165,6 +9439,13 @@
   <p:clrMapOvr>
     <a:masterClrMapping/>
   </p:clrMapOvr>
+  <p:timing>
+    <p:tnLst>
+      <p:par>
+        <p:cTn id="1" dur="indefinite" restart="never" nodeType="tmRoot"/>
+      </p:par>
+    </p:tnLst>
+  </p:timing>
 </p:sld>
 </file>
 
@@ -9227,7 +9508,7 @@
         </p:blipFill>
         <p:spPr>
           <a:xfrm>
-            <a:off x="457200" y="1611243"/>
+            <a:off x="457200" y="68682"/>
             <a:ext cx="8229600" cy="4525963"/>
           </a:xfrm>
         </p:spPr>
@@ -9284,6 +9565,13 @@
   <p:clrMapOvr>
     <a:masterClrMapping/>
   </p:clrMapOvr>
+  <p:timing>
+    <p:tnLst>
+      <p:par>
+        <p:cTn id="1" dur="indefinite" restart="never" nodeType="tmRoot"/>
+      </p:par>
+    </p:tnLst>
+  </p:timing>
 </p:sld>
 </file>
 
@@ -9448,6 +9736,13 @@
   <p:clrMapOvr>
     <a:masterClrMapping/>
   </p:clrMapOvr>
+  <p:timing>
+    <p:tnLst>
+      <p:par>
+        <p:cTn id="1" dur="indefinite" restart="never" nodeType="tmRoot"/>
+      </p:par>
+    </p:tnLst>
+  </p:timing>
 </p:sld>
 </file>
 
@@ -9508,7 +9803,12 @@
             <a:fillRect/>
           </a:stretch>
         </p:blipFill>
-        <p:spPr/>
+        <p:spPr>
+          <a:xfrm>
+            <a:off x="457200" y="1211682"/>
+            <a:ext cx="8229600" cy="4525963"/>
+          </a:xfrm>
+        </p:spPr>
       </p:pic>
       <p:sp>
         <p:nvSpPr>
@@ -9562,6 +9862,13 @@
   <p:clrMapOvr>
     <a:masterClrMapping/>
   </p:clrMapOvr>
+  <p:timing>
+    <p:tnLst>
+      <p:par>
+        <p:cTn id="1" dur="indefinite" restart="never" nodeType="tmRoot"/>
+      </p:par>
+    </p:tnLst>
+  </p:timing>
 </p:sld>
 </file>
 
@@ -9837,6 +10144,13 @@
   <p:clrMapOvr>
     <a:masterClrMapping/>
   </p:clrMapOvr>
+  <p:timing>
+    <p:tnLst>
+      <p:par>
+        <p:cTn id="1" dur="indefinite" restart="never" nodeType="tmRoot"/>
+      </p:par>
+    </p:tnLst>
+  </p:timing>
 </p:sld>
 </file>
 
@@ -9992,6 +10306,13 @@
   <p:clrMapOvr>
     <a:masterClrMapping/>
   </p:clrMapOvr>
+  <p:timing>
+    <p:tnLst>
+      <p:par>
+        <p:cTn id="1" dur="indefinite" restart="never" nodeType="tmRoot"/>
+      </p:par>
+    </p:tnLst>
+  </p:timing>
 </p:sld>
 </file>
 
@@ -10131,6 +10452,13 @@
   <p:clrMapOvr>
     <a:masterClrMapping/>
   </p:clrMapOvr>
+  <p:timing>
+    <p:tnLst>
+      <p:par>
+        <p:cTn id="1" dur="indefinite" restart="never" nodeType="tmRoot"/>
+      </p:par>
+    </p:tnLst>
+  </p:timing>
 </p:sld>
 </file>
 
@@ -10193,7 +10521,7 @@
         </p:blipFill>
         <p:spPr>
           <a:xfrm>
-            <a:off x="457200" y="0"/>
+            <a:off x="457200" y="-154609"/>
             <a:ext cx="8229600" cy="4525963"/>
           </a:xfrm>
         </p:spPr>
@@ -10250,6 +10578,13 @@
   <p:clrMapOvr>
     <a:masterClrMapping/>
   </p:clrMapOvr>
+  <p:timing>
+    <p:tnLst>
+      <p:par>
+        <p:cTn id="1" dur="indefinite" restart="never" nodeType="tmRoot"/>
+      </p:par>
+    </p:tnLst>
+  </p:timing>
 </p:sld>
 </file>
 
@@ -10459,6 +10794,13 @@
   <p:clrMapOvr>
     <a:masterClrMapping/>
   </p:clrMapOvr>
+  <p:timing>
+    <p:tnLst>
+      <p:par>
+        <p:cTn id="1" dur="indefinite" restart="never" nodeType="tmRoot"/>
+      </p:par>
+    </p:tnLst>
+  </p:timing>
 </p:sld>
 </file>
 
@@ -10533,7 +10875,12 @@
             <a:fillRect/>
           </a:stretch>
         </p:blipFill>
-        <p:spPr/>
+        <p:spPr>
+          <a:xfrm>
+            <a:off x="313635" y="-343452"/>
+            <a:ext cx="8229600" cy="4525963"/>
+          </a:xfrm>
+        </p:spPr>
       </p:pic>
       <p:sp>
         <p:nvSpPr>
@@ -10587,6 +10934,13 @@
   <p:clrMapOvr>
     <a:masterClrMapping/>
   </p:clrMapOvr>
+  <p:timing>
+    <p:tnLst>
+      <p:par>
+        <p:cTn id="1" dur="indefinite" restart="never" nodeType="tmRoot"/>
+      </p:par>
+    </p:tnLst>
+  </p:timing>
 </p:sld>
 </file>
 
@@ -10647,7 +11001,12 @@
             <a:fillRect/>
           </a:stretch>
         </p:blipFill>
-        <p:spPr/>
+        <p:spPr>
+          <a:xfrm>
+            <a:off x="457200" y="286026"/>
+            <a:ext cx="8229600" cy="4525963"/>
+          </a:xfrm>
+        </p:spPr>
       </p:pic>
       <p:sp>
         <p:nvSpPr>
@@ -10701,6 +11060,13 @@
   <p:clrMapOvr>
     <a:masterClrMapping/>
   </p:clrMapOvr>
+  <p:timing>
+    <p:tnLst>
+      <p:par>
+        <p:cTn id="1" dur="indefinite" restart="never" nodeType="tmRoot"/>
+      </p:par>
+    </p:tnLst>
+  </p:timing>
 </p:sld>
 </file>
 
@@ -10836,6 +11202,13 @@
   <p:clrMapOvr>
     <a:masterClrMapping/>
   </p:clrMapOvr>
+  <p:timing>
+    <p:tnLst>
+      <p:par>
+        <p:cTn id="1" dur="indefinite" restart="never" nodeType="tmRoot"/>
+      </p:par>
+    </p:tnLst>
+  </p:timing>
 </p:sld>
 </file>
 
@@ -10978,6 +11351,13 @@
   <p:clrMapOvr>
     <a:masterClrMapping/>
   </p:clrMapOvr>
+  <p:timing>
+    <p:tnLst>
+      <p:par>
+        <p:cTn id="1" dur="indefinite" restart="never" nodeType="tmRoot"/>
+      </p:par>
+    </p:tnLst>
+  </p:timing>
 </p:sld>
 </file>
 
@@ -11120,6 +11500,13 @@
   <p:clrMapOvr>
     <a:masterClrMapping/>
   </p:clrMapOvr>
+  <p:timing>
+    <p:tnLst>
+      <p:par>
+        <p:cTn id="1" dur="indefinite" restart="never" nodeType="tmRoot"/>
+      </p:par>
+    </p:tnLst>
+  </p:timing>
 </p:sld>
 </file>
 
@@ -11248,6 +11635,13 @@
   <p:clrMapOvr>
     <a:masterClrMapping/>
   </p:clrMapOvr>
+  <p:timing>
+    <p:tnLst>
+      <p:par>
+        <p:cTn id="1" dur="indefinite" restart="never" nodeType="tmRoot"/>
+      </p:par>
+    </p:tnLst>
+  </p:timing>
 </p:sld>
 </file>
 
@@ -11390,6 +11784,13 @@
   <p:clrMapOvr>
     <a:masterClrMapping/>
   </p:clrMapOvr>
+  <p:timing>
+    <p:tnLst>
+      <p:par>
+        <p:cTn id="1" dur="indefinite" restart="never" nodeType="tmRoot"/>
+      </p:par>
+    </p:tnLst>
+  </p:timing>
 </p:sld>
 </file>
 
@@ -11532,6 +11933,13 @@
   <p:clrMapOvr>
     <a:masterClrMapping/>
   </p:clrMapOvr>
+  <p:timing>
+    <p:tnLst>
+      <p:par>
+        <p:cTn id="1" dur="indefinite" restart="never" nodeType="tmRoot"/>
+      </p:par>
+    </p:tnLst>
+  </p:timing>
 </p:sld>
 </file>
 
@@ -11651,6 +12059,13 @@
   <p:clrMapOvr>
     <a:masterClrMapping/>
   </p:clrMapOvr>
+  <p:timing>
+    <p:tnLst>
+      <p:par>
+        <p:cTn id="1" dur="indefinite" restart="never" nodeType="tmRoot"/>
+      </p:par>
+    </p:tnLst>
+  </p:timing>
 </p:sld>
 </file>
 
@@ -11813,6 +12228,13 @@
   <p:clrMapOvr>
     <a:masterClrMapping/>
   </p:clrMapOvr>
+  <p:timing>
+    <p:tnLst>
+      <p:par>
+        <p:cTn id="1" dur="indefinite" restart="never" nodeType="tmRoot"/>
+      </p:par>
+    </p:tnLst>
+  </p:timing>
 </p:sld>
 </file>
 
@@ -11877,7 +12299,12 @@
             <a:fillRect/>
           </a:stretch>
         </p:blipFill>
-        <p:spPr/>
+        <p:spPr>
+          <a:xfrm>
+            <a:off x="457200" y="429592"/>
+            <a:ext cx="8229600" cy="4525963"/>
+          </a:xfrm>
+        </p:spPr>
       </p:pic>
       <p:sp>
         <p:nvSpPr>
@@ -11931,6 +12358,13 @@
   <p:clrMapOvr>
     <a:masterClrMapping/>
   </p:clrMapOvr>
+  <p:timing>
+    <p:tnLst>
+      <p:par>
+        <p:cTn id="1" dur="indefinite" restart="never" nodeType="tmRoot"/>
+      </p:par>
+    </p:tnLst>
+  </p:timing>
 </p:sld>
 </file>
 
@@ -12001,7 +12435,12 @@
             <a:fillRect/>
           </a:stretch>
         </p:blipFill>
-        <p:spPr/>
+        <p:spPr>
+          <a:xfrm>
+            <a:off x="457200" y="286026"/>
+            <a:ext cx="8229600" cy="4525963"/>
+          </a:xfrm>
+        </p:spPr>
       </p:pic>
       <p:sp>
         <p:nvSpPr>
@@ -12055,6 +12494,13 @@
   <p:clrMapOvr>
     <a:masterClrMapping/>
   </p:clrMapOvr>
+  <p:timing>
+    <p:tnLst>
+      <p:par>
+        <p:cTn id="1" dur="indefinite" restart="never" nodeType="tmRoot"/>
+      </p:par>
+    </p:tnLst>
+  </p:timing>
 </p:sld>
 </file>
 
@@ -12125,7 +12571,12 @@
             <a:fillRect/>
           </a:stretch>
         </p:blipFill>
-        <p:spPr/>
+        <p:spPr>
+          <a:xfrm>
+            <a:off x="457200" y="274982"/>
+            <a:ext cx="8229600" cy="4525963"/>
+          </a:xfrm>
+        </p:spPr>
       </p:pic>
       <p:sp>
         <p:nvSpPr>
@@ -12179,6 +12630,13 @@
   <p:clrMapOvr>
     <a:masterClrMapping/>
   </p:clrMapOvr>
+  <p:timing>
+    <p:tnLst>
+      <p:par>
+        <p:cTn id="1" dur="indefinite" restart="never" nodeType="tmRoot"/>
+      </p:par>
+    </p:tnLst>
+  </p:timing>
 </p:sld>
 </file>
 
@@ -12245,7 +12703,12 @@
             <a:fillRect/>
           </a:stretch>
         </p:blipFill>
-        <p:spPr/>
+        <p:spPr>
+          <a:xfrm>
+            <a:off x="457200" y="-166757"/>
+            <a:ext cx="8229600" cy="4525963"/>
+          </a:xfrm>
+        </p:spPr>
       </p:pic>
       <p:sp>
         <p:nvSpPr>
@@ -12299,6 +12762,13 @@
   <p:clrMapOvr>
     <a:masterClrMapping/>
   </p:clrMapOvr>
+  <p:timing>
+    <p:tnLst>
+      <p:par>
+        <p:cTn id="1" dur="indefinite" restart="never" nodeType="tmRoot"/>
+      </p:par>
+    </p:tnLst>
+  </p:timing>
 </p:sld>
 </file>
 
@@ -12419,6 +12889,13 @@
   <p:clrMapOvr>
     <a:masterClrMapping/>
   </p:clrMapOvr>
+  <p:timing>
+    <p:tnLst>
+      <p:par>
+        <p:cTn id="1" dur="indefinite" restart="never" nodeType="tmRoot"/>
+      </p:par>
+    </p:tnLst>
+  </p:timing>
 </p:sld>
 </file>
 
@@ -12570,6 +13047,13 @@
   <p:clrMapOvr>
     <a:masterClrMapping/>
   </p:clrMapOvr>
+  <p:timing>
+    <p:tnLst>
+      <p:par>
+        <p:cTn id="1" dur="indefinite" restart="never" nodeType="tmRoot"/>
+      </p:par>
+    </p:tnLst>
+  </p:timing>
 </p:sld>
 </file>
 
@@ -12704,6 +13188,13 @@
   <p:clrMapOvr>
     <a:masterClrMapping/>
   </p:clrMapOvr>
+  <p:timing>
+    <p:tnLst>
+      <p:par>
+        <p:cTn id="1" dur="indefinite" restart="never" nodeType="tmRoot"/>
+      </p:par>
+    </p:tnLst>
+  </p:timing>
 </p:sld>
 </file>
 
@@ -12842,6 +13333,13 @@
   <p:clrMapOvr>
     <a:masterClrMapping/>
   </p:clrMapOvr>
+  <p:timing>
+    <p:tnLst>
+      <p:par>
+        <p:cTn id="1" dur="indefinite" restart="never" nodeType="tmRoot"/>
+      </p:par>
+    </p:tnLst>
+  </p:timing>
 </p:sld>
 </file>
 
@@ -12984,6 +13482,13 @@
   <p:clrMapOvr>
     <a:masterClrMapping/>
   </p:clrMapOvr>
+  <p:timing>
+    <p:tnLst>
+      <p:par>
+        <p:cTn id="1" dur="indefinite" restart="never" nodeType="tmRoot"/>
+      </p:par>
+    </p:tnLst>
+  </p:timing>
 </p:sld>
 </file>
 
@@ -13132,6 +13637,13 @@
   <p:clrMapOvr>
     <a:masterClrMapping/>
   </p:clrMapOvr>
+  <p:timing>
+    <p:tnLst>
+      <p:par>
+        <p:cTn id="1" dur="indefinite" restart="never" nodeType="tmRoot"/>
+      </p:par>
+    </p:tnLst>
+  </p:timing>
 </p:sld>
 </file>
 
@@ -13281,6 +13793,13 @@
   <p:clrMapOvr>
     <a:masterClrMapping/>
   </p:clrMapOvr>
+  <p:timing>
+    <p:tnLst>
+      <p:par>
+        <p:cTn id="1" dur="indefinite" restart="never" nodeType="tmRoot"/>
+      </p:par>
+    </p:tnLst>
+  </p:timing>
 </p:sld>
 </file>
 
@@ -13436,6 +13955,13 @@
   <p:clrMapOvr>
     <a:masterClrMapping/>
   </p:clrMapOvr>
+  <p:timing>
+    <p:tnLst>
+      <p:par>
+        <p:cTn id="1" dur="indefinite" restart="never" nodeType="tmRoot"/>
+      </p:par>
+    </p:tnLst>
+  </p:timing>
 </p:sld>
 </file>
 
@@ -13611,6 +14137,13 @@
   <p:clrMapOvr>
     <a:masterClrMapping/>
   </p:clrMapOvr>
+  <p:timing>
+    <p:tnLst>
+      <p:par>
+        <p:cTn id="1" dur="indefinite" restart="never" nodeType="tmRoot"/>
+      </p:par>
+    </p:tnLst>
+  </p:timing>
 </p:sld>
 </file>
 
@@ -13761,6 +14294,13 @@
   <p:clrMapOvr>
     <a:masterClrMapping/>
   </p:clrMapOvr>
+  <p:timing>
+    <p:tnLst>
+      <p:par>
+        <p:cTn id="1" dur="indefinite" restart="never" nodeType="tmRoot"/>
+      </p:par>
+    </p:tnLst>
+  </p:timing>
 </p:sld>
 </file>
 
@@ -13926,6 +14466,13 @@
   <p:clrMapOvr>
     <a:masterClrMapping/>
   </p:clrMapOvr>
+  <p:timing>
+    <p:tnLst>
+      <p:par>
+        <p:cTn id="1" dur="indefinite" restart="never" nodeType="tmRoot"/>
+      </p:par>
+    </p:tnLst>
+  </p:timing>
 </p:sld>
 </file>
 
@@ -14060,6 +14607,13 @@
   <p:clrMapOvr>
     <a:masterClrMapping/>
   </p:clrMapOvr>
+  <p:timing>
+    <p:tnLst>
+      <p:par>
+        <p:cTn id="1" dur="indefinite" restart="never" nodeType="tmRoot"/>
+      </p:par>
+    </p:tnLst>
+  </p:timing>
 </p:sld>
 </file>
 
@@ -14195,6 +14749,13 @@
   <p:clrMapOvr>
     <a:masterClrMapping/>
   </p:clrMapOvr>
+  <p:timing>
+    <p:tnLst>
+      <p:par>
+        <p:cTn id="1" dur="indefinite" restart="never" nodeType="tmRoot"/>
+      </p:par>
+    </p:tnLst>
+  </p:timing>
 </p:sld>
 </file>
 

</xml_diff>